<commit_message>
Updated the Lua examples to 5.4.6. 4th one has a bug still...
</commit_message>
<xml_diff>
--- a/6044_FramPat/D2D/W11/W11_Timing_and_animations.pptx
+++ b/6044_FramPat/D2D/W11/W11_Timing_and_animations.pptx
@@ -14,6 +14,14 @@
     <p:sldId id="262" r:id="rId8"/>
     <p:sldId id="263" r:id="rId9"/>
     <p:sldId id="265" r:id="rId10"/>
+    <p:sldId id="266" r:id="rId11"/>
+    <p:sldId id="267" r:id="rId12"/>
+    <p:sldId id="268" r:id="rId13"/>
+    <p:sldId id="269" r:id="rId14"/>
+    <p:sldId id="270" r:id="rId15"/>
+    <p:sldId id="271" r:id="rId16"/>
+    <p:sldId id="272" r:id="rId17"/>
+    <p:sldId id="273" r:id="rId18"/>
   </p:sldIdLst>
   <p:sldSz cx="12192000" cy="6858000"/>
   <p:notesSz cx="6858000" cy="9144000"/>
@@ -112,6 +120,11 @@
       </a:defRPr>
     </a:lvl9pPr>
   </p:defaultTextStyle>
+  <p:extLst>
+    <p:ext uri="{EFAFB233-063F-42B5-8137-9DF3F51BA10A}">
+      <p15:sldGuideLst xmlns:p15="http://schemas.microsoft.com/office/powerpoint/2012/main"/>
+    </p:ext>
+  </p:extLst>
 </p:presentation>
 </file>
 
@@ -264,7 +277,7 @@
           <a:p>
             <a:fld id="{9D2A0A23-9773-4913-8748-7450C927C5BF}" type="datetimeFigureOut">
               <a:rPr lang="en-CA" smtClean="0"/>
-              <a:t>2023-11-13</a:t>
+              <a:t>2023-11-16</a:t>
             </a:fld>
             <a:endParaRPr lang="en-CA"/>
           </a:p>
@@ -464,7 +477,7 @@
           <a:p>
             <a:fld id="{9D2A0A23-9773-4913-8748-7450C927C5BF}" type="datetimeFigureOut">
               <a:rPr lang="en-CA" smtClean="0"/>
-              <a:t>2023-11-13</a:t>
+              <a:t>2023-11-16</a:t>
             </a:fld>
             <a:endParaRPr lang="en-CA"/>
           </a:p>
@@ -674,7 +687,7 @@
           <a:p>
             <a:fld id="{9D2A0A23-9773-4913-8748-7450C927C5BF}" type="datetimeFigureOut">
               <a:rPr lang="en-CA" smtClean="0"/>
-              <a:t>2023-11-13</a:t>
+              <a:t>2023-11-16</a:t>
             </a:fld>
             <a:endParaRPr lang="en-CA"/>
           </a:p>
@@ -874,7 +887,7 @@
           <a:p>
             <a:fld id="{9D2A0A23-9773-4913-8748-7450C927C5BF}" type="datetimeFigureOut">
               <a:rPr lang="en-CA" smtClean="0"/>
-              <a:t>2023-11-13</a:t>
+              <a:t>2023-11-16</a:t>
             </a:fld>
             <a:endParaRPr lang="en-CA"/>
           </a:p>
@@ -1150,7 +1163,7 @@
           <a:p>
             <a:fld id="{9D2A0A23-9773-4913-8748-7450C927C5BF}" type="datetimeFigureOut">
               <a:rPr lang="en-CA" smtClean="0"/>
-              <a:t>2023-11-13</a:t>
+              <a:t>2023-11-16</a:t>
             </a:fld>
             <a:endParaRPr lang="en-CA"/>
           </a:p>
@@ -1418,7 +1431,7 @@
           <a:p>
             <a:fld id="{9D2A0A23-9773-4913-8748-7450C927C5BF}" type="datetimeFigureOut">
               <a:rPr lang="en-CA" smtClean="0"/>
-              <a:t>2023-11-13</a:t>
+              <a:t>2023-11-16</a:t>
             </a:fld>
             <a:endParaRPr lang="en-CA"/>
           </a:p>
@@ -1833,7 +1846,7 @@
           <a:p>
             <a:fld id="{9D2A0A23-9773-4913-8748-7450C927C5BF}" type="datetimeFigureOut">
               <a:rPr lang="en-CA" smtClean="0"/>
-              <a:t>2023-11-13</a:t>
+              <a:t>2023-11-16</a:t>
             </a:fld>
             <a:endParaRPr lang="en-CA"/>
           </a:p>
@@ -1975,7 +1988,7 @@
           <a:p>
             <a:fld id="{9D2A0A23-9773-4913-8748-7450C927C5BF}" type="datetimeFigureOut">
               <a:rPr lang="en-CA" smtClean="0"/>
-              <a:t>2023-11-13</a:t>
+              <a:t>2023-11-16</a:t>
             </a:fld>
             <a:endParaRPr lang="en-CA"/>
           </a:p>
@@ -2088,7 +2101,7 @@
           <a:p>
             <a:fld id="{9D2A0A23-9773-4913-8748-7450C927C5BF}" type="datetimeFigureOut">
               <a:rPr lang="en-CA" smtClean="0"/>
-              <a:t>2023-11-13</a:t>
+              <a:t>2023-11-16</a:t>
             </a:fld>
             <a:endParaRPr lang="en-CA"/>
           </a:p>
@@ -2401,7 +2414,7 @@
           <a:p>
             <a:fld id="{9D2A0A23-9773-4913-8748-7450C927C5BF}" type="datetimeFigureOut">
               <a:rPr lang="en-CA" smtClean="0"/>
-              <a:t>2023-11-13</a:t>
+              <a:t>2023-11-16</a:t>
             </a:fld>
             <a:endParaRPr lang="en-CA"/>
           </a:p>
@@ -2690,7 +2703,7 @@
           <a:p>
             <a:fld id="{9D2A0A23-9773-4913-8748-7450C927C5BF}" type="datetimeFigureOut">
               <a:rPr lang="en-CA" smtClean="0"/>
-              <a:t>2023-11-13</a:t>
+              <a:t>2023-11-16</a:t>
             </a:fld>
             <a:endParaRPr lang="en-CA"/>
           </a:p>
@@ -2933,7 +2946,7 @@
           <a:p>
             <a:fld id="{9D2A0A23-9773-4913-8748-7450C927C5BF}" type="datetimeFigureOut">
               <a:rPr lang="en-CA" smtClean="0"/>
-              <a:t>2023-11-13</a:t>
+              <a:t>2023-11-16</a:t>
             </a:fld>
             <a:endParaRPr lang="en-CA"/>
           </a:p>
@@ -3413,6 +3426,1399 @@
 </p:sld>
 </file>
 
+<file path=ppt/slides/slide10.xml><?xml version="1.0" encoding="utf-8"?>
+<p:sld xmlns:a="http://schemas.openxmlformats.org/drawingml/2006/main" xmlns:r="http://schemas.openxmlformats.org/officeDocument/2006/relationships" xmlns:p="http://schemas.openxmlformats.org/presentationml/2006/main">
+  <p:cSld>
+    <p:spTree>
+      <p:nvGrpSpPr>
+        <p:cNvPr id="1" name=""/>
+        <p:cNvGrpSpPr/>
+        <p:nvPr/>
+      </p:nvGrpSpPr>
+      <p:grpSpPr>
+        <a:xfrm>
+          <a:off x="0" y="0"/>
+          <a:ext cx="0" cy="0"/>
+          <a:chOff x="0" y="0"/>
+          <a:chExt cx="0" cy="0"/>
+        </a:xfrm>
+      </p:grpSpPr>
+      <p:sp>
+        <p:nvSpPr>
+          <p:cNvPr id="2" name="Title 1">
+            <a:extLst>
+              <a:ext uri="{FF2B5EF4-FFF2-40B4-BE49-F238E27FC236}">
+                <a16:creationId xmlns:a16="http://schemas.microsoft.com/office/drawing/2014/main" id="{B73552DF-13FE-BD36-60F8-DEA44019452E}"/>
+              </a:ext>
+            </a:extLst>
+          </p:cNvPr>
+          <p:cNvSpPr>
+            <a:spLocks noGrp="1"/>
+          </p:cNvSpPr>
+          <p:nvPr>
+            <p:ph type="title"/>
+          </p:nvPr>
+        </p:nvSpPr>
+        <p:spPr/>
+        <p:txBody>
+          <a:bodyPr/>
+          <a:lstStyle/>
+          <a:p>
+            <a:r>
+              <a:rPr lang="en-CA" dirty="0" err="1"/>
+              <a:t>MoveTo</a:t>
+            </a:r>
+            <a:r>
+              <a:rPr lang="en-CA" dirty="0"/>
+              <a:t>( </a:t>
+            </a:r>
+            <a:r>
+              <a:rPr lang="en-CA" dirty="0" err="1"/>
+              <a:t>startXYZ</a:t>
+            </a:r>
+            <a:r>
+              <a:rPr lang="en-CA" dirty="0"/>
+              <a:t>, </a:t>
+            </a:r>
+            <a:r>
+              <a:rPr lang="en-CA" dirty="0" err="1"/>
+              <a:t>endXYZ</a:t>
+            </a:r>
+            <a:r>
+              <a:rPr lang="en-CA" dirty="0"/>
+              <a:t>, seconds)</a:t>
+            </a:r>
+          </a:p>
+        </p:txBody>
+      </p:sp>
+      <p:sp>
+        <p:nvSpPr>
+          <p:cNvPr id="3" name="Content Placeholder 2">
+            <a:extLst>
+              <a:ext uri="{FF2B5EF4-FFF2-40B4-BE49-F238E27FC236}">
+                <a16:creationId xmlns:a16="http://schemas.microsoft.com/office/drawing/2014/main" id="{B52C17F2-CD63-4A29-AA13-F38A3E16099E}"/>
+              </a:ext>
+            </a:extLst>
+          </p:cNvPr>
+          <p:cNvSpPr>
+            <a:spLocks noGrp="1"/>
+          </p:cNvSpPr>
+          <p:nvPr>
+            <p:ph idx="1"/>
+          </p:nvPr>
+        </p:nvSpPr>
+        <p:spPr/>
+        <p:txBody>
+          <a:bodyPr>
+            <a:normAutofit/>
+          </a:bodyPr>
+          <a:lstStyle/>
+          <a:p>
+            <a:r>
+              <a:rPr lang="en-CA" dirty="0"/>
+              <a:t>Start and end points </a:t>
+            </a:r>
+            <a:r>
+              <a:rPr lang="en-CA" dirty="0">
+                <a:sym typeface="Wingdings" panose="05000000000000000000" pitchFamily="2" charset="2"/>
+              </a:rPr>
+              <a:t> delta XYZ </a:t>
+            </a:r>
+          </a:p>
+          <a:p>
+            <a:pPr lvl="1"/>
+            <a:r>
+              <a:rPr lang="en-CA" dirty="0">
+                <a:sym typeface="Wingdings" panose="05000000000000000000" pitchFamily="2" charset="2"/>
+              </a:rPr>
+              <a:t>End – Start  Vector for direction</a:t>
+            </a:r>
+          </a:p>
+          <a:p>
+            <a:pPr lvl="1"/>
+            <a:r>
+              <a:rPr lang="en-CA" dirty="0">
+                <a:sym typeface="Wingdings" panose="05000000000000000000" pitchFamily="2" charset="2"/>
+              </a:rPr>
+              <a:t>Distance to travel = length( End – Start )   float (“as the crow flies”)</a:t>
+            </a:r>
+          </a:p>
+          <a:p>
+            <a:pPr lvl="1"/>
+            <a:r>
+              <a:rPr lang="en-CA" dirty="0">
+                <a:sym typeface="Wingdings" panose="05000000000000000000" pitchFamily="2" charset="2"/>
+              </a:rPr>
+              <a:t>Normalize( End – Start )  direction</a:t>
+            </a:r>
+          </a:p>
+          <a:p>
+            <a:r>
+              <a:rPr lang="en-CA" dirty="0">
+                <a:sym typeface="Wingdings" panose="05000000000000000000" pitchFamily="2" charset="2"/>
+              </a:rPr>
+              <a:t>To get </a:t>
+            </a:r>
+            <a:r>
+              <a:rPr lang="en-CA" dirty="0" err="1">
+                <a:sym typeface="Wingdings" panose="05000000000000000000" pitchFamily="2" charset="2"/>
+              </a:rPr>
+              <a:t>velocityXYZ</a:t>
+            </a:r>
+            <a:r>
+              <a:rPr lang="en-CA" dirty="0">
+                <a:sym typeface="Wingdings" panose="05000000000000000000" pitchFamily="2" charset="2"/>
+              </a:rPr>
+              <a:t>: take Length / Time</a:t>
+            </a:r>
+          </a:p>
+          <a:p>
+            <a:pPr lvl="1"/>
+            <a:r>
+              <a:rPr lang="en-CA" dirty="0">
+                <a:sym typeface="Wingdings" panose="05000000000000000000" pitchFamily="2" charset="2"/>
+              </a:rPr>
+              <a:t>Multiply that by the “direction”  velocity vector</a:t>
+            </a:r>
+          </a:p>
+          <a:p>
+            <a:r>
+              <a:rPr lang="en-CA" dirty="0">
+                <a:sym typeface="Wingdings" panose="05000000000000000000" pitchFamily="2" charset="2"/>
+              </a:rPr>
+              <a:t>Each frame, scale this to how long the frame was: i.e. </a:t>
+            </a:r>
+            <a:r>
+              <a:rPr lang="en-CA" dirty="0" err="1">
+                <a:sym typeface="Wingdings" panose="05000000000000000000" pitchFamily="2" charset="2"/>
+              </a:rPr>
+              <a:t>deltaTime</a:t>
+            </a:r>
+            <a:endParaRPr lang="en-CA" dirty="0">
+              <a:sym typeface="Wingdings" panose="05000000000000000000" pitchFamily="2" charset="2"/>
+            </a:endParaRPr>
+          </a:p>
+          <a:p>
+            <a:r>
+              <a:rPr lang="en-CA" dirty="0" err="1">
+                <a:sym typeface="Wingdings" panose="05000000000000000000" pitchFamily="2" charset="2"/>
+              </a:rPr>
+              <a:t>NewPos</a:t>
+            </a:r>
+            <a:r>
+              <a:rPr lang="en-CA" dirty="0">
+                <a:sym typeface="Wingdings" panose="05000000000000000000" pitchFamily="2" charset="2"/>
+              </a:rPr>
+              <a:t> = </a:t>
+            </a:r>
+            <a:r>
+              <a:rPr lang="en-CA" dirty="0" err="1">
+                <a:sym typeface="Wingdings" panose="05000000000000000000" pitchFamily="2" charset="2"/>
+              </a:rPr>
+              <a:t>CurrentPos</a:t>
+            </a:r>
+            <a:r>
+              <a:rPr lang="en-CA" dirty="0">
+                <a:sym typeface="Wingdings" panose="05000000000000000000" pitchFamily="2" charset="2"/>
+              </a:rPr>
+              <a:t> + ( </a:t>
+            </a:r>
+            <a:r>
+              <a:rPr lang="en-CA" dirty="0" err="1">
+                <a:sym typeface="Wingdings" panose="05000000000000000000" pitchFamily="2" charset="2"/>
+              </a:rPr>
+              <a:t>VelocityXYZ</a:t>
+            </a:r>
+            <a:r>
+              <a:rPr lang="en-CA" dirty="0">
+                <a:sym typeface="Wingdings" panose="05000000000000000000" pitchFamily="2" charset="2"/>
+              </a:rPr>
+              <a:t> * </a:t>
+            </a:r>
+            <a:r>
+              <a:rPr lang="en-CA" dirty="0" err="1">
+                <a:sym typeface="Wingdings" panose="05000000000000000000" pitchFamily="2" charset="2"/>
+              </a:rPr>
+              <a:t>deltaTime</a:t>
+            </a:r>
+            <a:r>
+              <a:rPr lang="en-CA" dirty="0">
+                <a:sym typeface="Wingdings" panose="05000000000000000000" pitchFamily="2" charset="2"/>
+              </a:rPr>
+              <a:t> );</a:t>
+            </a:r>
+            <a:endParaRPr lang="en-CA" dirty="0"/>
+          </a:p>
+          <a:p>
+            <a:endParaRPr lang="en-CA" dirty="0"/>
+          </a:p>
+        </p:txBody>
+      </p:sp>
+    </p:spTree>
+    <p:extLst>
+      <p:ext uri="{BB962C8B-B14F-4D97-AF65-F5344CB8AC3E}">
+        <p14:creationId xmlns:p14="http://schemas.microsoft.com/office/powerpoint/2010/main" val="765000161"/>
+      </p:ext>
+    </p:extLst>
+  </p:cSld>
+  <p:clrMapOvr>
+    <a:masterClrMapping/>
+  </p:clrMapOvr>
+</p:sld>
+</file>
+
+<file path=ppt/slides/slide11.xml><?xml version="1.0" encoding="utf-8"?>
+<p:sld xmlns:a="http://schemas.openxmlformats.org/drawingml/2006/main" xmlns:r="http://schemas.openxmlformats.org/officeDocument/2006/relationships" xmlns:p="http://schemas.openxmlformats.org/presentationml/2006/main">
+  <p:cSld>
+    <p:spTree>
+      <p:nvGrpSpPr>
+        <p:cNvPr id="1" name=""/>
+        <p:cNvGrpSpPr/>
+        <p:nvPr/>
+      </p:nvGrpSpPr>
+      <p:grpSpPr>
+        <a:xfrm>
+          <a:off x="0" y="0"/>
+          <a:ext cx="0" cy="0"/>
+          <a:chOff x="0" y="0"/>
+          <a:chExt cx="0" cy="0"/>
+        </a:xfrm>
+      </p:grpSpPr>
+      <p:sp>
+        <p:nvSpPr>
+          <p:cNvPr id="2" name="Title 1">
+            <a:extLst>
+              <a:ext uri="{FF2B5EF4-FFF2-40B4-BE49-F238E27FC236}">
+                <a16:creationId xmlns:a16="http://schemas.microsoft.com/office/drawing/2014/main" id="{B73552DF-13FE-BD36-60F8-DEA44019452E}"/>
+              </a:ext>
+            </a:extLst>
+          </p:cNvPr>
+          <p:cNvSpPr>
+            <a:spLocks noGrp="1"/>
+          </p:cNvSpPr>
+          <p:nvPr>
+            <p:ph type="title"/>
+          </p:nvPr>
+        </p:nvSpPr>
+        <p:spPr>
+          <a:xfrm>
+            <a:off x="403123" y="365125"/>
+            <a:ext cx="11582400" cy="1325563"/>
+          </a:xfrm>
+        </p:spPr>
+        <p:txBody>
+          <a:bodyPr/>
+          <a:lstStyle/>
+          <a:p>
+            <a:r>
+              <a:rPr lang="en-CA" dirty="0" err="1"/>
+              <a:t>MoveTo</a:t>
+            </a:r>
+            <a:r>
+              <a:rPr lang="en-CA" dirty="0"/>
+              <a:t>( </a:t>
+            </a:r>
+            <a:r>
+              <a:rPr lang="en-CA" dirty="0" err="1"/>
+              <a:t>startXYZ</a:t>
+            </a:r>
+            <a:r>
+              <a:rPr lang="en-CA" dirty="0"/>
+              <a:t>, </a:t>
+            </a:r>
+            <a:r>
+              <a:rPr lang="en-CA" dirty="0" err="1"/>
+              <a:t>directionXYZ</a:t>
+            </a:r>
+            <a:r>
+              <a:rPr lang="en-CA" dirty="0"/>
+              <a:t>, speed, seconds )</a:t>
+            </a:r>
+          </a:p>
+        </p:txBody>
+      </p:sp>
+      <p:sp>
+        <p:nvSpPr>
+          <p:cNvPr id="3" name="Content Placeholder 2">
+            <a:extLst>
+              <a:ext uri="{FF2B5EF4-FFF2-40B4-BE49-F238E27FC236}">
+                <a16:creationId xmlns:a16="http://schemas.microsoft.com/office/drawing/2014/main" id="{B52C17F2-CD63-4A29-AA13-F38A3E16099E}"/>
+              </a:ext>
+            </a:extLst>
+          </p:cNvPr>
+          <p:cNvSpPr>
+            <a:spLocks noGrp="1"/>
+          </p:cNvSpPr>
+          <p:nvPr>
+            <p:ph idx="1"/>
+          </p:nvPr>
+        </p:nvSpPr>
+        <p:spPr/>
+        <p:txBody>
+          <a:bodyPr>
+            <a:normAutofit/>
+          </a:bodyPr>
+          <a:lstStyle/>
+          <a:p>
+            <a:r>
+              <a:rPr lang="en-CA" dirty="0"/>
+              <a:t>Same thing as before, except you don’t know the end location…</a:t>
+            </a:r>
+          </a:p>
+          <a:p>
+            <a:r>
+              <a:rPr lang="en-CA" dirty="0"/>
+              <a:t>…or do you?</a:t>
+            </a:r>
+          </a:p>
+          <a:p>
+            <a:r>
+              <a:rPr lang="en-CA" dirty="0" err="1"/>
+              <a:t>VeloictyXYZ</a:t>
+            </a:r>
+            <a:r>
+              <a:rPr lang="en-CA" dirty="0"/>
+              <a:t> = (</a:t>
+            </a:r>
+            <a:r>
+              <a:rPr lang="en-CA" dirty="0" err="1"/>
+              <a:t>directionXYZ</a:t>
+            </a:r>
+            <a:r>
+              <a:rPr lang="en-CA" dirty="0"/>
+              <a:t> * speed * seconds)</a:t>
+            </a:r>
+          </a:p>
+          <a:p>
+            <a:r>
+              <a:rPr lang="en-CA" dirty="0"/>
+              <a:t>Another way to think of this is that you are calculating the </a:t>
+            </a:r>
+            <a:r>
+              <a:rPr lang="en-CA" dirty="0" err="1"/>
+              <a:t>endXYZ</a:t>
+            </a:r>
+            <a:r>
+              <a:rPr lang="en-CA" dirty="0"/>
+              <a:t> and calling the previous function</a:t>
+            </a:r>
+          </a:p>
+          <a:p>
+            <a:endParaRPr lang="en-CA" dirty="0"/>
+          </a:p>
+        </p:txBody>
+      </p:sp>
+    </p:spTree>
+    <p:extLst>
+      <p:ext uri="{BB962C8B-B14F-4D97-AF65-F5344CB8AC3E}">
+        <p14:creationId xmlns:p14="http://schemas.microsoft.com/office/powerpoint/2010/main" val="3712541975"/>
+      </p:ext>
+    </p:extLst>
+  </p:cSld>
+  <p:clrMapOvr>
+    <a:masterClrMapping/>
+  </p:clrMapOvr>
+</p:sld>
+</file>
+
+<file path=ppt/slides/slide12.xml><?xml version="1.0" encoding="utf-8"?>
+<p:sld xmlns:a="http://schemas.openxmlformats.org/drawingml/2006/main" xmlns:r="http://schemas.openxmlformats.org/officeDocument/2006/relationships" xmlns:p="http://schemas.openxmlformats.org/presentationml/2006/main">
+  <p:cSld>
+    <p:spTree>
+      <p:nvGrpSpPr>
+        <p:cNvPr id="1" name=""/>
+        <p:cNvGrpSpPr/>
+        <p:nvPr/>
+      </p:nvGrpSpPr>
+      <p:grpSpPr>
+        <a:xfrm>
+          <a:off x="0" y="0"/>
+          <a:ext cx="0" cy="0"/>
+          <a:chOff x="0" y="0"/>
+          <a:chExt cx="0" cy="0"/>
+        </a:xfrm>
+      </p:grpSpPr>
+      <p:sp>
+        <p:nvSpPr>
+          <p:cNvPr id="2" name="Title 1">
+            <a:extLst>
+              <a:ext uri="{FF2B5EF4-FFF2-40B4-BE49-F238E27FC236}">
+                <a16:creationId xmlns:a16="http://schemas.microsoft.com/office/drawing/2014/main" id="{B73552DF-13FE-BD36-60F8-DEA44019452E}"/>
+              </a:ext>
+            </a:extLst>
+          </p:cNvPr>
+          <p:cNvSpPr>
+            <a:spLocks noGrp="1"/>
+          </p:cNvSpPr>
+          <p:nvPr>
+            <p:ph type="title"/>
+          </p:nvPr>
+        </p:nvSpPr>
+        <p:spPr>
+          <a:xfrm>
+            <a:off x="403123" y="365125"/>
+            <a:ext cx="11582400" cy="1325563"/>
+          </a:xfrm>
+        </p:spPr>
+        <p:txBody>
+          <a:bodyPr/>
+          <a:lstStyle/>
+          <a:p>
+            <a:r>
+              <a:rPr lang="en-CA" dirty="0" err="1"/>
+              <a:t>MoveTo</a:t>
+            </a:r>
+            <a:r>
+              <a:rPr lang="en-CA" dirty="0"/>
+              <a:t>( </a:t>
+            </a:r>
+            <a:r>
+              <a:rPr lang="en-CA" dirty="0" err="1"/>
+              <a:t>startXYZ</a:t>
+            </a:r>
+            <a:r>
+              <a:rPr lang="en-CA" dirty="0"/>
+              <a:t>, </a:t>
+            </a:r>
+            <a:r>
+              <a:rPr lang="en-CA" dirty="0" err="1"/>
+              <a:t>velocityXYZ</a:t>
+            </a:r>
+            <a:r>
+              <a:rPr lang="en-CA" dirty="0"/>
+              <a:t>, seconds)</a:t>
+            </a:r>
+          </a:p>
+        </p:txBody>
+      </p:sp>
+      <p:sp>
+        <p:nvSpPr>
+          <p:cNvPr id="3" name="Content Placeholder 2">
+            <a:extLst>
+              <a:ext uri="{FF2B5EF4-FFF2-40B4-BE49-F238E27FC236}">
+                <a16:creationId xmlns:a16="http://schemas.microsoft.com/office/drawing/2014/main" id="{B52C17F2-CD63-4A29-AA13-F38A3E16099E}"/>
+              </a:ext>
+            </a:extLst>
+          </p:cNvPr>
+          <p:cNvSpPr>
+            <a:spLocks noGrp="1"/>
+          </p:cNvSpPr>
+          <p:nvPr>
+            <p:ph idx="1"/>
+          </p:nvPr>
+        </p:nvSpPr>
+        <p:spPr/>
+        <p:txBody>
+          <a:bodyPr>
+            <a:normAutofit/>
+          </a:bodyPr>
+          <a:lstStyle/>
+          <a:p>
+            <a:r>
+              <a:rPr lang="en-CA" dirty="0"/>
+              <a:t>Here you have all the things you need:</a:t>
+            </a:r>
+          </a:p>
+          <a:p>
+            <a:r>
+              <a:rPr lang="en-CA" dirty="0" err="1">
+                <a:sym typeface="Wingdings" panose="05000000000000000000" pitchFamily="2" charset="2"/>
+              </a:rPr>
+              <a:t>NewPos</a:t>
+            </a:r>
+            <a:r>
+              <a:rPr lang="en-CA" dirty="0">
+                <a:sym typeface="Wingdings" panose="05000000000000000000" pitchFamily="2" charset="2"/>
+              </a:rPr>
+              <a:t> = </a:t>
+            </a:r>
+            <a:r>
+              <a:rPr lang="en-CA" dirty="0" err="1">
+                <a:sym typeface="Wingdings" panose="05000000000000000000" pitchFamily="2" charset="2"/>
+              </a:rPr>
+              <a:t>CurrentPos</a:t>
+            </a:r>
+            <a:r>
+              <a:rPr lang="en-CA" dirty="0">
+                <a:sym typeface="Wingdings" panose="05000000000000000000" pitchFamily="2" charset="2"/>
+              </a:rPr>
+              <a:t> + ( </a:t>
+            </a:r>
+            <a:r>
+              <a:rPr lang="en-CA" dirty="0" err="1">
+                <a:sym typeface="Wingdings" panose="05000000000000000000" pitchFamily="2" charset="2"/>
+              </a:rPr>
+              <a:t>VelocityXYZ</a:t>
+            </a:r>
+            <a:r>
+              <a:rPr lang="en-CA" dirty="0">
+                <a:sym typeface="Wingdings" panose="05000000000000000000" pitchFamily="2" charset="2"/>
+              </a:rPr>
+              <a:t> * </a:t>
+            </a:r>
+            <a:r>
+              <a:rPr lang="en-CA" dirty="0" err="1">
+                <a:sym typeface="Wingdings" panose="05000000000000000000" pitchFamily="2" charset="2"/>
+              </a:rPr>
+              <a:t>deltaTime</a:t>
+            </a:r>
+            <a:r>
+              <a:rPr lang="en-CA" dirty="0">
+                <a:sym typeface="Wingdings" panose="05000000000000000000" pitchFamily="2" charset="2"/>
+              </a:rPr>
+              <a:t> );</a:t>
+            </a:r>
+          </a:p>
+          <a:p>
+            <a:endParaRPr lang="en-CA" dirty="0">
+              <a:sym typeface="Wingdings" panose="05000000000000000000" pitchFamily="2" charset="2"/>
+            </a:endParaRPr>
+          </a:p>
+          <a:p>
+            <a:endParaRPr lang="en-CA" dirty="0">
+              <a:sym typeface="Wingdings" panose="05000000000000000000" pitchFamily="2" charset="2"/>
+            </a:endParaRPr>
+          </a:p>
+          <a:p>
+            <a:endParaRPr lang="en-CA" dirty="0">
+              <a:sym typeface="Wingdings" panose="05000000000000000000" pitchFamily="2" charset="2"/>
+            </a:endParaRPr>
+          </a:p>
+          <a:p>
+            <a:r>
+              <a:rPr lang="en-CA" dirty="0">
+                <a:sym typeface="Wingdings" panose="05000000000000000000" pitchFamily="2" charset="2"/>
+              </a:rPr>
+              <a:t>There’s other variations, too. Just pick one (or two)</a:t>
+            </a:r>
+            <a:endParaRPr lang="en-CA" dirty="0"/>
+          </a:p>
+          <a:p>
+            <a:endParaRPr lang="en-CA" dirty="0"/>
+          </a:p>
+        </p:txBody>
+      </p:sp>
+    </p:spTree>
+    <p:extLst>
+      <p:ext uri="{BB962C8B-B14F-4D97-AF65-F5344CB8AC3E}">
+        <p14:creationId xmlns:p14="http://schemas.microsoft.com/office/powerpoint/2010/main" val="12732688"/>
+      </p:ext>
+    </p:extLst>
+  </p:cSld>
+  <p:clrMapOvr>
+    <a:masterClrMapping/>
+  </p:clrMapOvr>
+</p:sld>
+</file>
+
+<file path=ppt/slides/slide13.xml><?xml version="1.0" encoding="utf-8"?>
+<p:sld xmlns:a="http://schemas.openxmlformats.org/drawingml/2006/main" xmlns:r="http://schemas.openxmlformats.org/officeDocument/2006/relationships" xmlns:p="http://schemas.openxmlformats.org/presentationml/2006/main">
+  <p:cSld>
+    <p:spTree>
+      <p:nvGrpSpPr>
+        <p:cNvPr id="1" name=""/>
+        <p:cNvGrpSpPr/>
+        <p:nvPr/>
+      </p:nvGrpSpPr>
+      <p:grpSpPr>
+        <a:xfrm>
+          <a:off x="0" y="0"/>
+          <a:ext cx="0" cy="0"/>
+          <a:chOff x="0" y="0"/>
+          <a:chExt cx="0" cy="0"/>
+        </a:xfrm>
+      </p:grpSpPr>
+      <p:sp>
+        <p:nvSpPr>
+          <p:cNvPr id="2" name="Title 1">
+            <a:extLst>
+              <a:ext uri="{FF2B5EF4-FFF2-40B4-BE49-F238E27FC236}">
+                <a16:creationId xmlns:a16="http://schemas.microsoft.com/office/drawing/2014/main" id="{B73552DF-13FE-BD36-60F8-DEA44019452E}"/>
+              </a:ext>
+            </a:extLst>
+          </p:cNvPr>
+          <p:cNvSpPr>
+            <a:spLocks noGrp="1"/>
+          </p:cNvSpPr>
+          <p:nvPr>
+            <p:ph type="title"/>
+          </p:nvPr>
+        </p:nvSpPr>
+        <p:spPr>
+          <a:xfrm>
+            <a:off x="403123" y="365125"/>
+            <a:ext cx="11582400" cy="1325563"/>
+          </a:xfrm>
+        </p:spPr>
+        <p:txBody>
+          <a:bodyPr/>
+          <a:lstStyle/>
+          <a:p>
+            <a:r>
+              <a:rPr lang="en-CA" dirty="0" err="1"/>
+              <a:t>MoveTo</a:t>
+            </a:r>
+            <a:r>
+              <a:rPr lang="en-CA" dirty="0"/>
+              <a:t>() </a:t>
+            </a:r>
+            <a:r>
+              <a:rPr lang="en-CA" dirty="0">
+                <a:sym typeface="Wingdings" panose="05000000000000000000" pitchFamily="2" charset="2"/>
+              </a:rPr>
+              <a:t> how is it done? </a:t>
+            </a:r>
+            <a:endParaRPr lang="en-CA" dirty="0"/>
+          </a:p>
+        </p:txBody>
+      </p:sp>
+      <p:sp>
+        <p:nvSpPr>
+          <p:cNvPr id="3" name="Content Placeholder 2">
+            <a:extLst>
+              <a:ext uri="{FF2B5EF4-FFF2-40B4-BE49-F238E27FC236}">
+                <a16:creationId xmlns:a16="http://schemas.microsoft.com/office/drawing/2014/main" id="{B52C17F2-CD63-4A29-AA13-F38A3E16099E}"/>
+              </a:ext>
+            </a:extLst>
+          </p:cNvPr>
+          <p:cNvSpPr>
+            <a:spLocks noGrp="1"/>
+          </p:cNvSpPr>
+          <p:nvPr>
+            <p:ph idx="1"/>
+          </p:nvPr>
+        </p:nvSpPr>
+        <p:spPr>
+          <a:xfrm>
+            <a:off x="838200" y="1690688"/>
+            <a:ext cx="10515600" cy="4486275"/>
+          </a:xfrm>
+        </p:spPr>
+        <p:txBody>
+          <a:bodyPr>
+            <a:normAutofit/>
+          </a:bodyPr>
+          <a:lstStyle/>
+          <a:p>
+            <a:r>
+              <a:rPr lang="en-CA" dirty="0"/>
+              <a:t>1) It’s at the end position</a:t>
+            </a:r>
+          </a:p>
+          <a:p>
+            <a:r>
+              <a:rPr lang="en-CA" dirty="0"/>
+              <a:t>2) Check elapsed time</a:t>
+            </a:r>
+          </a:p>
+          <a:p>
+            <a:endParaRPr lang="en-CA" dirty="0"/>
+          </a:p>
+          <a:p>
+            <a:endParaRPr lang="en-CA" dirty="0"/>
+          </a:p>
+        </p:txBody>
+      </p:sp>
+    </p:spTree>
+    <p:extLst>
+      <p:ext uri="{BB962C8B-B14F-4D97-AF65-F5344CB8AC3E}">
+        <p14:creationId xmlns:p14="http://schemas.microsoft.com/office/powerpoint/2010/main" val="2202345885"/>
+      </p:ext>
+    </p:extLst>
+  </p:cSld>
+  <p:clrMapOvr>
+    <a:masterClrMapping/>
+  </p:clrMapOvr>
+</p:sld>
+</file>
+
+<file path=ppt/slides/slide14.xml><?xml version="1.0" encoding="utf-8"?>
+<p:sld xmlns:a="http://schemas.openxmlformats.org/drawingml/2006/main" xmlns:r="http://schemas.openxmlformats.org/officeDocument/2006/relationships" xmlns:p="http://schemas.openxmlformats.org/presentationml/2006/main">
+  <p:cSld>
+    <p:spTree>
+      <p:nvGrpSpPr>
+        <p:cNvPr id="1" name=""/>
+        <p:cNvGrpSpPr/>
+        <p:nvPr/>
+      </p:nvGrpSpPr>
+      <p:grpSpPr>
+        <a:xfrm>
+          <a:off x="0" y="0"/>
+          <a:ext cx="0" cy="0"/>
+          <a:chOff x="0" y="0"/>
+          <a:chExt cx="0" cy="0"/>
+        </a:xfrm>
+      </p:grpSpPr>
+      <p:sp>
+        <p:nvSpPr>
+          <p:cNvPr id="2" name="Title 1">
+            <a:extLst>
+              <a:ext uri="{FF2B5EF4-FFF2-40B4-BE49-F238E27FC236}">
+                <a16:creationId xmlns:a16="http://schemas.microsoft.com/office/drawing/2014/main" id="{B73552DF-13FE-BD36-60F8-DEA44019452E}"/>
+              </a:ext>
+            </a:extLst>
+          </p:cNvPr>
+          <p:cNvSpPr>
+            <a:spLocks noGrp="1"/>
+          </p:cNvSpPr>
+          <p:nvPr>
+            <p:ph type="title"/>
+          </p:nvPr>
+        </p:nvSpPr>
+        <p:spPr>
+          <a:xfrm>
+            <a:off x="403123" y="365125"/>
+            <a:ext cx="11582400" cy="1325563"/>
+          </a:xfrm>
+        </p:spPr>
+        <p:txBody>
+          <a:bodyPr/>
+          <a:lstStyle/>
+          <a:p>
+            <a:r>
+              <a:rPr lang="en-CA" dirty="0" err="1"/>
+              <a:t>MoveTo</a:t>
+            </a:r>
+            <a:r>
+              <a:rPr lang="en-CA" dirty="0"/>
+              <a:t>() </a:t>
+            </a:r>
+            <a:r>
+              <a:rPr lang="en-CA" dirty="0">
+                <a:sym typeface="Wingdings" panose="05000000000000000000" pitchFamily="2" charset="2"/>
+              </a:rPr>
+              <a:t> how is it done? </a:t>
+            </a:r>
+            <a:endParaRPr lang="en-CA" dirty="0"/>
+          </a:p>
+        </p:txBody>
+      </p:sp>
+      <p:sp>
+        <p:nvSpPr>
+          <p:cNvPr id="3" name="Content Placeholder 2">
+            <a:extLst>
+              <a:ext uri="{FF2B5EF4-FFF2-40B4-BE49-F238E27FC236}">
+                <a16:creationId xmlns:a16="http://schemas.microsoft.com/office/drawing/2014/main" id="{B52C17F2-CD63-4A29-AA13-F38A3E16099E}"/>
+              </a:ext>
+            </a:extLst>
+          </p:cNvPr>
+          <p:cNvSpPr>
+            <a:spLocks noGrp="1"/>
+          </p:cNvSpPr>
+          <p:nvPr>
+            <p:ph idx="1"/>
+          </p:nvPr>
+        </p:nvSpPr>
+        <p:spPr>
+          <a:xfrm>
+            <a:off x="838200" y="1690688"/>
+            <a:ext cx="10515600" cy="4486275"/>
+          </a:xfrm>
+        </p:spPr>
+        <p:txBody>
+          <a:bodyPr>
+            <a:normAutofit/>
+          </a:bodyPr>
+          <a:lstStyle/>
+          <a:p>
+            <a:r>
+              <a:rPr lang="en-CA" dirty="0"/>
+              <a:t>1) It’s at the end position</a:t>
+            </a:r>
+          </a:p>
+          <a:p>
+            <a:pPr lvl="1"/>
+            <a:r>
+              <a:rPr lang="en-CA" dirty="0"/>
+              <a:t>Compare with distance to some location or some shape like an AABB</a:t>
+            </a:r>
+          </a:p>
+          <a:p>
+            <a:pPr lvl="1"/>
+            <a:r>
+              <a:rPr lang="en-CA" dirty="0"/>
+              <a:t>With floating point, you NEVER EVER do this:</a:t>
+            </a:r>
+          </a:p>
+          <a:p>
+            <a:pPr lvl="2"/>
+            <a:r>
+              <a:rPr lang="en-CA" dirty="0"/>
+              <a:t>If ( x == y )		where x and y are float</a:t>
+            </a:r>
+          </a:p>
+          <a:p>
+            <a:pPr lvl="2"/>
+            <a:r>
+              <a:rPr lang="en-CA" dirty="0"/>
+              <a:t>They will NEVER be equal (only if they were set and only a few numbers are like this: 0.0, 1.0 and a few more are like this)</a:t>
+            </a:r>
+          </a:p>
+          <a:p>
+            <a:pPr lvl="1"/>
+            <a:r>
+              <a:rPr lang="en-CA" dirty="0"/>
+              <a:t>float x = 0.0f; 	float y = 0.0f</a:t>
+            </a:r>
+          </a:p>
+          <a:p>
+            <a:pPr lvl="1"/>
+            <a:r>
+              <a:rPr lang="en-CA" dirty="0"/>
+              <a:t>If ( x == y ) </a:t>
+            </a:r>
+            <a:r>
+              <a:rPr lang="en-CA" dirty="0">
+                <a:sym typeface="Wingdings" panose="05000000000000000000" pitchFamily="2" charset="2"/>
+              </a:rPr>
+              <a:t> that would work</a:t>
+            </a:r>
+          </a:p>
+          <a:p>
+            <a:pPr lvl="1"/>
+            <a:r>
+              <a:rPr lang="en-CA" dirty="0">
+                <a:sym typeface="Wingdings" panose="05000000000000000000" pitchFamily="2" charset="2"/>
+              </a:rPr>
+              <a:t>Try setting a floating point number to 2, or 5 or something like that</a:t>
+            </a:r>
+          </a:p>
+          <a:p>
+            <a:pPr lvl="1"/>
+            <a:r>
+              <a:rPr lang="en-CA" dirty="0">
+                <a:hlinkClick r:id="rId2"/>
+              </a:rPr>
+              <a:t>https://en.wikipedia.org/wiki/Machine_epsilon</a:t>
+            </a:r>
+            <a:r>
+              <a:rPr lang="en-CA" dirty="0">
+                <a:sym typeface="Wingdings" panose="05000000000000000000" pitchFamily="2" charset="2"/>
+              </a:rPr>
+              <a:t> </a:t>
+            </a:r>
+          </a:p>
+          <a:p>
+            <a:pPr lvl="1"/>
+            <a:r>
+              <a:rPr lang="en-CA" dirty="0">
+                <a:sym typeface="Wingdings" panose="05000000000000000000" pitchFamily="2" charset="2"/>
+              </a:rPr>
+              <a:t>If ( (x-epsilon) &lt;= y  || (</a:t>
+            </a:r>
+            <a:r>
+              <a:rPr lang="en-CA" dirty="0" err="1">
+                <a:sym typeface="Wingdings" panose="05000000000000000000" pitchFamily="2" charset="2"/>
+              </a:rPr>
+              <a:t>x+epsilon</a:t>
+            </a:r>
+            <a:r>
+              <a:rPr lang="en-CA" dirty="0">
+                <a:sym typeface="Wingdings" panose="05000000000000000000" pitchFamily="2" charset="2"/>
+              </a:rPr>
+              <a:t>) &gt;= y  )  then it’s NOT equal</a:t>
+            </a:r>
+            <a:endParaRPr lang="en-CA" dirty="0"/>
+          </a:p>
+          <a:p>
+            <a:pPr marL="0" indent="0">
+              <a:buNone/>
+            </a:pPr>
+            <a:endParaRPr lang="en-CA" dirty="0"/>
+          </a:p>
+          <a:p>
+            <a:endParaRPr lang="en-CA" dirty="0"/>
+          </a:p>
+        </p:txBody>
+      </p:sp>
+    </p:spTree>
+    <p:extLst>
+      <p:ext uri="{BB962C8B-B14F-4D97-AF65-F5344CB8AC3E}">
+        <p14:creationId xmlns:p14="http://schemas.microsoft.com/office/powerpoint/2010/main" val="2785202944"/>
+      </p:ext>
+    </p:extLst>
+  </p:cSld>
+  <p:clrMapOvr>
+    <a:masterClrMapping/>
+  </p:clrMapOvr>
+</p:sld>
+</file>
+
+<file path=ppt/slides/slide15.xml><?xml version="1.0" encoding="utf-8"?>
+<p:sld xmlns:a="http://schemas.openxmlformats.org/drawingml/2006/main" xmlns:r="http://schemas.openxmlformats.org/officeDocument/2006/relationships" xmlns:p="http://schemas.openxmlformats.org/presentationml/2006/main">
+  <p:cSld>
+    <p:spTree>
+      <p:nvGrpSpPr>
+        <p:cNvPr id="1" name=""/>
+        <p:cNvGrpSpPr/>
+        <p:nvPr/>
+      </p:nvGrpSpPr>
+      <p:grpSpPr>
+        <a:xfrm>
+          <a:off x="0" y="0"/>
+          <a:ext cx="0" cy="0"/>
+          <a:chOff x="0" y="0"/>
+          <a:chExt cx="0" cy="0"/>
+        </a:xfrm>
+      </p:grpSpPr>
+      <p:sp>
+        <p:nvSpPr>
+          <p:cNvPr id="2" name="Title 1">
+            <a:extLst>
+              <a:ext uri="{FF2B5EF4-FFF2-40B4-BE49-F238E27FC236}">
+                <a16:creationId xmlns:a16="http://schemas.microsoft.com/office/drawing/2014/main" id="{B73552DF-13FE-BD36-60F8-DEA44019452E}"/>
+              </a:ext>
+            </a:extLst>
+          </p:cNvPr>
+          <p:cNvSpPr>
+            <a:spLocks noGrp="1"/>
+          </p:cNvSpPr>
+          <p:nvPr>
+            <p:ph type="title"/>
+          </p:nvPr>
+        </p:nvSpPr>
+        <p:spPr>
+          <a:xfrm>
+            <a:off x="403123" y="365125"/>
+            <a:ext cx="11582400" cy="1325563"/>
+          </a:xfrm>
+        </p:spPr>
+        <p:txBody>
+          <a:bodyPr/>
+          <a:lstStyle/>
+          <a:p>
+            <a:r>
+              <a:rPr lang="en-CA" dirty="0" err="1"/>
+              <a:t>MoveTo</a:t>
+            </a:r>
+            <a:r>
+              <a:rPr lang="en-CA" dirty="0"/>
+              <a:t>() </a:t>
+            </a:r>
+            <a:r>
+              <a:rPr lang="en-CA" dirty="0">
+                <a:sym typeface="Wingdings" panose="05000000000000000000" pitchFamily="2" charset="2"/>
+              </a:rPr>
+              <a:t> how is it done? </a:t>
+            </a:r>
+            <a:endParaRPr lang="en-CA" dirty="0"/>
+          </a:p>
+        </p:txBody>
+      </p:sp>
+      <p:sp>
+        <p:nvSpPr>
+          <p:cNvPr id="3" name="Content Placeholder 2">
+            <a:extLst>
+              <a:ext uri="{FF2B5EF4-FFF2-40B4-BE49-F238E27FC236}">
+                <a16:creationId xmlns:a16="http://schemas.microsoft.com/office/drawing/2014/main" id="{B52C17F2-CD63-4A29-AA13-F38A3E16099E}"/>
+              </a:ext>
+            </a:extLst>
+          </p:cNvPr>
+          <p:cNvSpPr>
+            <a:spLocks noGrp="1"/>
+          </p:cNvSpPr>
+          <p:nvPr>
+            <p:ph idx="1"/>
+          </p:nvPr>
+        </p:nvSpPr>
+        <p:spPr>
+          <a:xfrm>
+            <a:off x="838200" y="1690688"/>
+            <a:ext cx="10515600" cy="4486275"/>
+          </a:xfrm>
+        </p:spPr>
+        <p:txBody>
+          <a:bodyPr>
+            <a:normAutofit/>
+          </a:bodyPr>
+          <a:lstStyle/>
+          <a:p>
+            <a:r>
+              <a:rPr lang="en-CA" dirty="0"/>
+              <a:t>1) Time</a:t>
+            </a:r>
+          </a:p>
+          <a:p>
+            <a:pPr lvl="1"/>
+            <a:r>
+              <a:rPr lang="en-CA" dirty="0"/>
+              <a:t>This might work better because if </a:t>
+            </a:r>
+            <a:r>
+              <a:rPr lang="en-CA" dirty="0" err="1"/>
+              <a:t>elapsedTime</a:t>
+            </a:r>
+            <a:r>
+              <a:rPr lang="en-CA" dirty="0"/>
+              <a:t> &lt; </a:t>
+            </a:r>
+            <a:r>
+              <a:rPr lang="en-CA" dirty="0" err="1"/>
+              <a:t>HowLongItsGonnaTake</a:t>
+            </a:r>
+            <a:endParaRPr lang="en-CA" dirty="0"/>
+          </a:p>
+          <a:p>
+            <a:pPr lvl="2"/>
+            <a:r>
+              <a:rPr lang="en-CA" dirty="0"/>
+              <a:t>…then we’re not done moving.</a:t>
+            </a:r>
+          </a:p>
+          <a:p>
+            <a:pPr marL="0" indent="0">
+              <a:buNone/>
+            </a:pPr>
+            <a:endParaRPr lang="en-CA" dirty="0"/>
+          </a:p>
+          <a:p>
+            <a:endParaRPr lang="en-CA" dirty="0"/>
+          </a:p>
+        </p:txBody>
+      </p:sp>
+    </p:spTree>
+    <p:extLst>
+      <p:ext uri="{BB962C8B-B14F-4D97-AF65-F5344CB8AC3E}">
+        <p14:creationId xmlns:p14="http://schemas.microsoft.com/office/powerpoint/2010/main" val="834020216"/>
+      </p:ext>
+    </p:extLst>
+  </p:cSld>
+  <p:clrMapOvr>
+    <a:masterClrMapping/>
+  </p:clrMapOvr>
+</p:sld>
+</file>
+
+<file path=ppt/slides/slide16.xml><?xml version="1.0" encoding="utf-8"?>
+<p:sld xmlns:a="http://schemas.openxmlformats.org/drawingml/2006/main" xmlns:r="http://schemas.openxmlformats.org/officeDocument/2006/relationships" xmlns:p="http://schemas.openxmlformats.org/presentationml/2006/main">
+  <p:cSld>
+    <p:spTree>
+      <p:nvGrpSpPr>
+        <p:cNvPr id="1" name=""/>
+        <p:cNvGrpSpPr/>
+        <p:nvPr/>
+      </p:nvGrpSpPr>
+      <p:grpSpPr>
+        <a:xfrm>
+          <a:off x="0" y="0"/>
+          <a:ext cx="0" cy="0"/>
+          <a:chOff x="0" y="0"/>
+          <a:chExt cx="0" cy="0"/>
+        </a:xfrm>
+      </p:grpSpPr>
+      <p:sp>
+        <p:nvSpPr>
+          <p:cNvPr id="2" name="Title 1">
+            <a:extLst>
+              <a:ext uri="{FF2B5EF4-FFF2-40B4-BE49-F238E27FC236}">
+                <a16:creationId xmlns:a16="http://schemas.microsoft.com/office/drawing/2014/main" id="{B73552DF-13FE-BD36-60F8-DEA44019452E}"/>
+              </a:ext>
+            </a:extLst>
+          </p:cNvPr>
+          <p:cNvSpPr>
+            <a:spLocks noGrp="1"/>
+          </p:cNvSpPr>
+          <p:nvPr>
+            <p:ph type="title"/>
+          </p:nvPr>
+        </p:nvSpPr>
+        <p:spPr>
+          <a:xfrm>
+            <a:off x="403123" y="365125"/>
+            <a:ext cx="11582400" cy="1325563"/>
+          </a:xfrm>
+        </p:spPr>
+        <p:txBody>
+          <a:bodyPr/>
+          <a:lstStyle/>
+          <a:p>
+            <a:r>
+              <a:rPr lang="en-CA" dirty="0" err="1"/>
+              <a:t>OrientTo</a:t>
+            </a:r>
+            <a:r>
+              <a:rPr lang="en-CA" dirty="0"/>
+              <a:t>()</a:t>
+            </a:r>
+          </a:p>
+        </p:txBody>
+      </p:sp>
+      <p:sp>
+        <p:nvSpPr>
+          <p:cNvPr id="3" name="Content Placeholder 2">
+            <a:extLst>
+              <a:ext uri="{FF2B5EF4-FFF2-40B4-BE49-F238E27FC236}">
+                <a16:creationId xmlns:a16="http://schemas.microsoft.com/office/drawing/2014/main" id="{B52C17F2-CD63-4A29-AA13-F38A3E16099E}"/>
+              </a:ext>
+            </a:extLst>
+          </p:cNvPr>
+          <p:cNvSpPr>
+            <a:spLocks noGrp="1"/>
+          </p:cNvSpPr>
+          <p:nvPr>
+            <p:ph idx="1"/>
+          </p:nvPr>
+        </p:nvSpPr>
+        <p:spPr>
+          <a:xfrm>
+            <a:off x="838200" y="1690688"/>
+            <a:ext cx="10515600" cy="4486275"/>
+          </a:xfrm>
+        </p:spPr>
+        <p:txBody>
+          <a:bodyPr>
+            <a:normAutofit/>
+          </a:bodyPr>
+          <a:lstStyle/>
+          <a:p>
+            <a:r>
+              <a:rPr lang="en-CA" dirty="0"/>
+              <a:t>Just like </a:t>
+            </a:r>
+            <a:r>
+              <a:rPr lang="en-CA" dirty="0" err="1"/>
+              <a:t>MoveTo</a:t>
+            </a:r>
+            <a:r>
+              <a:rPr lang="en-CA" dirty="0"/>
+              <a:t>() except you are setting the rotation of the object.</a:t>
+            </a:r>
+          </a:p>
+          <a:p>
+            <a:r>
+              <a:rPr lang="en-CA" dirty="0"/>
+              <a:t>Replace position with angle… and </a:t>
+            </a:r>
+            <a:r>
+              <a:rPr lang="en-CA" dirty="0" err="1"/>
+              <a:t>hazzah</a:t>
+            </a:r>
+            <a:r>
+              <a:rPr lang="en-CA" dirty="0"/>
+              <a:t>! Yer done!</a:t>
+            </a:r>
+          </a:p>
+          <a:p>
+            <a:r>
+              <a:rPr lang="en-CA" dirty="0"/>
+              <a:t>Have to be a little careful with angles &gt; 180.0</a:t>
+            </a:r>
+          </a:p>
+          <a:p>
+            <a:pPr lvl="1"/>
+            <a:r>
+              <a:rPr lang="en-CA" dirty="0"/>
+              <a:t>It might rotate the “wrong way”</a:t>
+            </a:r>
+          </a:p>
+          <a:p>
+            <a:r>
+              <a:rPr lang="en-CA" dirty="0"/>
+              <a:t>Be very careful with the </a:t>
+            </a:r>
+            <a:r>
+              <a:rPr lang="en-CA" dirty="0" err="1"/>
+              <a:t>quaterion</a:t>
+            </a:r>
+            <a:r>
+              <a:rPr lang="en-CA" dirty="0"/>
+              <a:t> </a:t>
+            </a:r>
+            <a:r>
+              <a:rPr lang="en-CA" dirty="0">
+                <a:sym typeface="Wingdings" panose="05000000000000000000" pitchFamily="2" charset="2"/>
+              </a:rPr>
+              <a:t> Euler conversion as it will give you the shortest angle. </a:t>
+            </a:r>
+            <a:endParaRPr lang="en-CA" dirty="0"/>
+          </a:p>
+          <a:p>
+            <a:pPr marL="0" indent="0">
+              <a:buNone/>
+            </a:pPr>
+            <a:endParaRPr lang="en-CA" dirty="0"/>
+          </a:p>
+          <a:p>
+            <a:endParaRPr lang="en-CA" dirty="0"/>
+          </a:p>
+        </p:txBody>
+      </p:sp>
+    </p:spTree>
+    <p:extLst>
+      <p:ext uri="{BB962C8B-B14F-4D97-AF65-F5344CB8AC3E}">
+        <p14:creationId xmlns:p14="http://schemas.microsoft.com/office/powerpoint/2010/main" val="2312837484"/>
+      </p:ext>
+    </p:extLst>
+  </p:cSld>
+  <p:clrMapOvr>
+    <a:masterClrMapping/>
+  </p:clrMapOvr>
+</p:sld>
+</file>
+
+<file path=ppt/slides/slide17.xml><?xml version="1.0" encoding="utf-8"?>
+<p:sld xmlns:a="http://schemas.openxmlformats.org/drawingml/2006/main" xmlns:r="http://schemas.openxmlformats.org/officeDocument/2006/relationships" xmlns:p="http://schemas.openxmlformats.org/presentationml/2006/main">
+  <p:cSld>
+    <p:spTree>
+      <p:nvGrpSpPr>
+        <p:cNvPr id="1" name=""/>
+        <p:cNvGrpSpPr/>
+        <p:nvPr/>
+      </p:nvGrpSpPr>
+      <p:grpSpPr>
+        <a:xfrm>
+          <a:off x="0" y="0"/>
+          <a:ext cx="0" cy="0"/>
+          <a:chOff x="0" y="0"/>
+          <a:chExt cx="0" cy="0"/>
+        </a:xfrm>
+      </p:grpSpPr>
+      <p:sp>
+        <p:nvSpPr>
+          <p:cNvPr id="2" name="Title 1">
+            <a:extLst>
+              <a:ext uri="{FF2B5EF4-FFF2-40B4-BE49-F238E27FC236}">
+                <a16:creationId xmlns:a16="http://schemas.microsoft.com/office/drawing/2014/main" id="{B73552DF-13FE-BD36-60F8-DEA44019452E}"/>
+              </a:ext>
+            </a:extLst>
+          </p:cNvPr>
+          <p:cNvSpPr>
+            <a:spLocks noGrp="1"/>
+          </p:cNvSpPr>
+          <p:nvPr>
+            <p:ph type="title"/>
+          </p:nvPr>
+        </p:nvSpPr>
+        <p:spPr>
+          <a:xfrm>
+            <a:off x="403123" y="365125"/>
+            <a:ext cx="11582400" cy="1325563"/>
+          </a:xfrm>
+        </p:spPr>
+        <p:txBody>
+          <a:bodyPr/>
+          <a:lstStyle/>
+          <a:p>
+            <a:r>
+              <a:rPr lang="en-CA" dirty="0"/>
+              <a:t>Ease in and ease out</a:t>
+            </a:r>
+          </a:p>
+        </p:txBody>
+      </p:sp>
+      <p:sp>
+        <p:nvSpPr>
+          <p:cNvPr id="3" name="Content Placeholder 2">
+            <a:extLst>
+              <a:ext uri="{FF2B5EF4-FFF2-40B4-BE49-F238E27FC236}">
+                <a16:creationId xmlns:a16="http://schemas.microsoft.com/office/drawing/2014/main" id="{B52C17F2-CD63-4A29-AA13-F38A3E16099E}"/>
+              </a:ext>
+            </a:extLst>
+          </p:cNvPr>
+          <p:cNvSpPr>
+            <a:spLocks noGrp="1"/>
+          </p:cNvSpPr>
+          <p:nvPr>
+            <p:ph idx="1"/>
+          </p:nvPr>
+        </p:nvSpPr>
+        <p:spPr>
+          <a:xfrm>
+            <a:off x="838200" y="1690688"/>
+            <a:ext cx="10515600" cy="4486275"/>
+          </a:xfrm>
+        </p:spPr>
+        <p:txBody>
+          <a:bodyPr>
+            <a:normAutofit/>
+          </a:bodyPr>
+          <a:lstStyle/>
+          <a:p>
+            <a:r>
+              <a:rPr lang="en-CA" dirty="0"/>
+              <a:t>Just like </a:t>
+            </a:r>
+            <a:r>
+              <a:rPr lang="en-CA" dirty="0" err="1"/>
+              <a:t>MoveTo</a:t>
+            </a:r>
+            <a:r>
+              <a:rPr lang="en-CA" dirty="0"/>
+              <a:t>() except you are setting the rotation of the object.</a:t>
+            </a:r>
+          </a:p>
+          <a:p>
+            <a:r>
+              <a:rPr lang="en-CA" dirty="0"/>
+              <a:t>Replace position with angle… and </a:t>
+            </a:r>
+            <a:r>
+              <a:rPr lang="en-CA" dirty="0" err="1"/>
+              <a:t>hazzah</a:t>
+            </a:r>
+            <a:r>
+              <a:rPr lang="en-CA" dirty="0"/>
+              <a:t>! Yer done!</a:t>
+            </a:r>
+          </a:p>
+          <a:p>
+            <a:r>
+              <a:rPr lang="en-CA" dirty="0"/>
+              <a:t>Have to be a little careful with angles &gt; 180.0</a:t>
+            </a:r>
+          </a:p>
+          <a:p>
+            <a:pPr lvl="1"/>
+            <a:r>
+              <a:rPr lang="en-CA" dirty="0"/>
+              <a:t>It might rotate the “wrong way”</a:t>
+            </a:r>
+          </a:p>
+          <a:p>
+            <a:r>
+              <a:rPr lang="en-CA" dirty="0"/>
+              <a:t>Be very careful with the </a:t>
+            </a:r>
+            <a:r>
+              <a:rPr lang="en-CA" dirty="0" err="1"/>
+              <a:t>quaterion</a:t>
+            </a:r>
+            <a:r>
+              <a:rPr lang="en-CA" dirty="0"/>
+              <a:t> </a:t>
+            </a:r>
+            <a:r>
+              <a:rPr lang="en-CA" dirty="0">
+                <a:sym typeface="Wingdings" panose="05000000000000000000" pitchFamily="2" charset="2"/>
+              </a:rPr>
+              <a:t> Euler conversion as it will give you the shortest angle. </a:t>
+            </a:r>
+            <a:endParaRPr lang="en-CA" dirty="0"/>
+          </a:p>
+          <a:p>
+            <a:pPr marL="0" indent="0">
+              <a:buNone/>
+            </a:pPr>
+            <a:endParaRPr lang="en-CA" dirty="0"/>
+          </a:p>
+          <a:p>
+            <a:endParaRPr lang="en-CA" dirty="0"/>
+          </a:p>
+        </p:txBody>
+      </p:sp>
+    </p:spTree>
+    <p:extLst>
+      <p:ext uri="{BB962C8B-B14F-4D97-AF65-F5344CB8AC3E}">
+        <p14:creationId xmlns:p14="http://schemas.microsoft.com/office/powerpoint/2010/main" val="332834110"/>
+      </p:ext>
+    </p:extLst>
+  </p:cSld>
+  <p:clrMapOvr>
+    <a:masterClrMapping/>
+  </p:clrMapOvr>
+</p:sld>
+</file>
+
 <file path=ppt/slides/slide2.xml><?xml version="1.0" encoding="utf-8"?>
 <p:sld xmlns:a="http://schemas.openxmlformats.org/drawingml/2006/main" xmlns:r="http://schemas.openxmlformats.org/officeDocument/2006/relationships" xmlns:p="http://schemas.openxmlformats.org/presentationml/2006/main">
   <p:cSld>

</xml_diff>

<commit_message>
Fun fun fun with Lua
</commit_message>
<xml_diff>
--- a/6044_FramPat/D2D/W11/W11_Timing_and_animations.pptx
+++ b/6044_FramPat/D2D/W11/W11_Timing_and_animations.pptx
@@ -20,8 +20,10 @@
     <p:sldId id="269" r:id="rId14"/>
     <p:sldId id="270" r:id="rId15"/>
     <p:sldId id="271" r:id="rId16"/>
-    <p:sldId id="272" r:id="rId17"/>
-    <p:sldId id="273" r:id="rId18"/>
+    <p:sldId id="274" r:id="rId17"/>
+    <p:sldId id="272" r:id="rId18"/>
+    <p:sldId id="273" r:id="rId19"/>
+    <p:sldId id="275" r:id="rId20"/>
   </p:sldIdLst>
   <p:sldSz cx="12192000" cy="6858000"/>
   <p:notesSz cx="6858000" cy="9144000"/>
@@ -4534,12 +4536,19 @@
           <a:p>
             <a:r>
               <a:rPr lang="en-CA" dirty="0" err="1"/>
-              <a:t>OrientTo</a:t>
-            </a:r>
-            <a:r>
-              <a:rPr lang="en-CA" dirty="0"/>
-              <a:t>()</a:t>
-            </a:r>
+              <a:t>MoveTo</a:t>
+            </a:r>
+            <a:r>
+              <a:rPr lang="en-CA" dirty="0"/>
+              <a:t>() </a:t>
+            </a:r>
+            <a:r>
+              <a:rPr lang="en-CA" dirty="0">
+                <a:sym typeface="Wingdings" panose="05000000000000000000" pitchFamily="2" charset="2"/>
+              </a:rPr>
+              <a:t>location, velocity, and time  Oh no</a:t>
+            </a:r>
+            <a:endParaRPr lang="en-CA" dirty="0"/>
           </a:p>
         </p:txBody>
       </p:sp>
@@ -4561,8 +4570,8 @@
         </p:nvSpPr>
         <p:spPr>
           <a:xfrm>
-            <a:off x="838200" y="1690688"/>
-            <a:ext cx="10515600" cy="4486275"/>
+            <a:off x="403123" y="1690688"/>
+            <a:ext cx="10950677" cy="4486275"/>
           </a:xfrm>
         </p:spPr>
         <p:txBody>
@@ -4573,62 +4582,56 @@
           <a:p>
             <a:r>
               <a:rPr lang="en-CA" dirty="0"/>
-              <a:t>Just like </a:t>
-            </a:r>
-            <a:r>
-              <a:rPr lang="en-CA" dirty="0" err="1"/>
-              <a:t>MoveTo</a:t>
-            </a:r>
-            <a:r>
-              <a:rPr lang="en-CA" dirty="0"/>
-              <a:t>() except you are setting the rotation of the object.</a:t>
-            </a:r>
-          </a:p>
-          <a:p>
-            <a:r>
-              <a:rPr lang="en-CA" dirty="0"/>
-              <a:t>Replace position with angle… and </a:t>
-            </a:r>
-            <a:r>
-              <a:rPr lang="en-CA" dirty="0" err="1"/>
-              <a:t>hazzah</a:t>
-            </a:r>
-            <a:r>
-              <a:rPr lang="en-CA" dirty="0"/>
-              <a:t>! Yer done!</a:t>
-            </a:r>
-          </a:p>
-          <a:p>
-            <a:r>
-              <a:rPr lang="en-CA" dirty="0"/>
-              <a:t>Have to be a little careful with angles &gt; 180.0</a:t>
-            </a:r>
-          </a:p>
-          <a:p>
-            <a:pPr lvl="1"/>
-            <a:r>
-              <a:rPr lang="en-CA" dirty="0"/>
-              <a:t>It might rotate the “wrong way”</a:t>
-            </a:r>
-          </a:p>
-          <a:p>
-            <a:r>
-              <a:rPr lang="en-CA" dirty="0"/>
-              <a:t>Be very careful with the </a:t>
-            </a:r>
-            <a:r>
-              <a:rPr lang="en-CA" dirty="0" err="1"/>
-              <a:t>quaterion</a:t>
-            </a:r>
-            <a:r>
-              <a:rPr lang="en-CA" dirty="0"/>
-              <a:t> </a:t>
+              <a:t>Start and end in X seconds </a:t>
             </a:r>
             <a:r>
               <a:rPr lang="en-CA" dirty="0">
                 <a:sym typeface="Wingdings" panose="05000000000000000000" pitchFamily="2" charset="2"/>
               </a:rPr>
-              <a:t> Euler conversion as it will give you the shortest angle. </a:t>
+              <a:t> velocity</a:t>
+            </a:r>
+          </a:p>
+          <a:p>
+            <a:r>
+              <a:rPr lang="en-CA" dirty="0">
+                <a:sym typeface="Wingdings" panose="05000000000000000000" pitchFamily="2" charset="2"/>
+              </a:rPr>
+              <a:t>Start and velocity in X seconds  end location</a:t>
+            </a:r>
+          </a:p>
+          <a:p>
+            <a:pPr lvl="1"/>
+            <a:r>
+              <a:rPr lang="en-CA" dirty="0">
+                <a:sym typeface="Wingdings" panose="05000000000000000000" pitchFamily="2" charset="2"/>
+              </a:rPr>
+              <a:t>Start &amp; End</a:t>
+            </a:r>
+          </a:p>
+          <a:p>
+            <a:pPr lvl="1"/>
+            <a:r>
+              <a:rPr lang="en-CA" dirty="0">
+                <a:sym typeface="Wingdings" panose="05000000000000000000" pitchFamily="2" charset="2"/>
+              </a:rPr>
+              <a:t>Velocity</a:t>
+            </a:r>
+          </a:p>
+          <a:p>
+            <a:pPr lvl="1"/>
+            <a:r>
+              <a:rPr lang="en-CA" dirty="0">
+                <a:sym typeface="Wingdings" panose="05000000000000000000" pitchFamily="2" charset="2"/>
+              </a:rPr>
+              <a:t>Time</a:t>
+            </a:r>
+          </a:p>
+          <a:p>
+            <a:r>
+              <a:rPr lang="en-CA" dirty="0">
+                <a:sym typeface="Wingdings" panose="05000000000000000000" pitchFamily="2" charset="2"/>
+              </a:rPr>
+              <a:t>Run from 0m to 50m in 10 seconds at 50 m/s</a:t>
             </a:r>
             <a:endParaRPr lang="en-CA" dirty="0"/>
           </a:p>
@@ -4646,7 +4649,7 @@
     </p:spTree>
     <p:extLst>
       <p:ext uri="{BB962C8B-B14F-4D97-AF65-F5344CB8AC3E}">
-        <p14:creationId xmlns:p14="http://schemas.microsoft.com/office/powerpoint/2010/main" val="2312837484"/>
+        <p14:creationId xmlns:p14="http://schemas.microsoft.com/office/powerpoint/2010/main" val="4289958844"/>
       </p:ext>
     </p:extLst>
   </p:cSld>
@@ -4700,8 +4703,12 @@
           <a:lstStyle/>
           <a:p>
             <a:r>
-              <a:rPr lang="en-CA" dirty="0"/>
-              <a:t>Ease in and ease out</a:t>
+              <a:rPr lang="en-CA" dirty="0" err="1"/>
+              <a:t>OrientTo</a:t>
+            </a:r>
+            <a:r>
+              <a:rPr lang="en-CA" dirty="0"/>
+              <a:t>()</a:t>
             </a:r>
           </a:p>
         </p:txBody>
@@ -4809,7 +4816,328 @@
     </p:spTree>
     <p:extLst>
       <p:ext uri="{BB962C8B-B14F-4D97-AF65-F5344CB8AC3E}">
+        <p14:creationId xmlns:p14="http://schemas.microsoft.com/office/powerpoint/2010/main" val="2312837484"/>
+      </p:ext>
+    </p:extLst>
+  </p:cSld>
+  <p:clrMapOvr>
+    <a:masterClrMapping/>
+  </p:clrMapOvr>
+</p:sld>
+</file>
+
+<file path=ppt/slides/slide18.xml><?xml version="1.0" encoding="utf-8"?>
+<p:sld xmlns:a="http://schemas.openxmlformats.org/drawingml/2006/main" xmlns:r="http://schemas.openxmlformats.org/officeDocument/2006/relationships" xmlns:p="http://schemas.openxmlformats.org/presentationml/2006/main">
+  <p:cSld>
+    <p:spTree>
+      <p:nvGrpSpPr>
+        <p:cNvPr id="1" name=""/>
+        <p:cNvGrpSpPr/>
+        <p:nvPr/>
+      </p:nvGrpSpPr>
+      <p:grpSpPr>
+        <a:xfrm>
+          <a:off x="0" y="0"/>
+          <a:ext cx="0" cy="0"/>
+          <a:chOff x="0" y="0"/>
+          <a:chExt cx="0" cy="0"/>
+        </a:xfrm>
+      </p:grpSpPr>
+      <p:sp>
+        <p:nvSpPr>
+          <p:cNvPr id="2" name="Title 1">
+            <a:extLst>
+              <a:ext uri="{FF2B5EF4-FFF2-40B4-BE49-F238E27FC236}">
+                <a16:creationId xmlns:a16="http://schemas.microsoft.com/office/drawing/2014/main" id="{B73552DF-13FE-BD36-60F8-DEA44019452E}"/>
+              </a:ext>
+            </a:extLst>
+          </p:cNvPr>
+          <p:cNvSpPr>
+            <a:spLocks noGrp="1"/>
+          </p:cNvSpPr>
+          <p:nvPr>
+            <p:ph type="title"/>
+          </p:nvPr>
+        </p:nvSpPr>
+        <p:spPr>
+          <a:xfrm>
+            <a:off x="403123" y="365125"/>
+            <a:ext cx="11582400" cy="1325563"/>
+          </a:xfrm>
+        </p:spPr>
+        <p:txBody>
+          <a:bodyPr/>
+          <a:lstStyle/>
+          <a:p>
+            <a:r>
+              <a:rPr lang="en-CA" dirty="0"/>
+              <a:t>Ease in and ease out</a:t>
+            </a:r>
+          </a:p>
+        </p:txBody>
+      </p:sp>
+      <p:sp>
+        <p:nvSpPr>
+          <p:cNvPr id="3" name="Content Placeholder 2">
+            <a:extLst>
+              <a:ext uri="{FF2B5EF4-FFF2-40B4-BE49-F238E27FC236}">
+                <a16:creationId xmlns:a16="http://schemas.microsoft.com/office/drawing/2014/main" id="{B52C17F2-CD63-4A29-AA13-F38A3E16099E}"/>
+              </a:ext>
+            </a:extLst>
+          </p:cNvPr>
+          <p:cNvSpPr>
+            <a:spLocks noGrp="1"/>
+          </p:cNvSpPr>
+          <p:nvPr>
+            <p:ph idx="1"/>
+          </p:nvPr>
+        </p:nvSpPr>
+        <p:spPr>
+          <a:xfrm>
+            <a:off x="838200" y="1690688"/>
+            <a:ext cx="10515600" cy="4486275"/>
+          </a:xfrm>
+        </p:spPr>
+        <p:txBody>
+          <a:bodyPr>
+            <a:normAutofit/>
+          </a:bodyPr>
+          <a:lstStyle/>
+          <a:p>
+            <a:r>
+              <a:rPr lang="en-CA" dirty="0"/>
+              <a:t>Just like </a:t>
+            </a:r>
+            <a:r>
+              <a:rPr lang="en-CA" dirty="0" err="1"/>
+              <a:t>MoveTo</a:t>
+            </a:r>
+            <a:r>
+              <a:rPr lang="en-CA" dirty="0"/>
+              <a:t>() except you are setting the rotation of the object.</a:t>
+            </a:r>
+          </a:p>
+          <a:p>
+            <a:r>
+              <a:rPr lang="en-CA" dirty="0"/>
+              <a:t>Replace position with angle… and </a:t>
+            </a:r>
+            <a:r>
+              <a:rPr lang="en-CA" dirty="0" err="1"/>
+              <a:t>hazzah</a:t>
+            </a:r>
+            <a:r>
+              <a:rPr lang="en-CA" dirty="0"/>
+              <a:t>! Yer done!</a:t>
+            </a:r>
+          </a:p>
+          <a:p>
+            <a:r>
+              <a:rPr lang="en-CA" dirty="0"/>
+              <a:t>Have to be a little careful with angles &gt; 180.0</a:t>
+            </a:r>
+          </a:p>
+          <a:p>
+            <a:pPr lvl="1"/>
+            <a:r>
+              <a:rPr lang="en-CA" dirty="0"/>
+              <a:t>It might rotate the “wrong way”</a:t>
+            </a:r>
+          </a:p>
+          <a:p>
+            <a:r>
+              <a:rPr lang="en-CA" dirty="0"/>
+              <a:t>Be very careful with the </a:t>
+            </a:r>
+            <a:r>
+              <a:rPr lang="en-CA" dirty="0" err="1"/>
+              <a:t>quaterion</a:t>
+            </a:r>
+            <a:r>
+              <a:rPr lang="en-CA" dirty="0"/>
+              <a:t> </a:t>
+            </a:r>
+            <a:r>
+              <a:rPr lang="en-CA" dirty="0">
+                <a:sym typeface="Wingdings" panose="05000000000000000000" pitchFamily="2" charset="2"/>
+              </a:rPr>
+              <a:t> Euler conversion as it will give you the shortest angle. </a:t>
+            </a:r>
+            <a:endParaRPr lang="en-CA" dirty="0"/>
+          </a:p>
+          <a:p>
+            <a:pPr marL="0" indent="0">
+              <a:buNone/>
+            </a:pPr>
+            <a:endParaRPr lang="en-CA" dirty="0"/>
+          </a:p>
+          <a:p>
+            <a:endParaRPr lang="en-CA" dirty="0"/>
+          </a:p>
+        </p:txBody>
+      </p:sp>
+    </p:spTree>
+    <p:extLst>
+      <p:ext uri="{BB962C8B-B14F-4D97-AF65-F5344CB8AC3E}">
         <p14:creationId xmlns:p14="http://schemas.microsoft.com/office/powerpoint/2010/main" val="332834110"/>
+      </p:ext>
+    </p:extLst>
+  </p:cSld>
+  <p:clrMapOvr>
+    <a:masterClrMapping/>
+  </p:clrMapOvr>
+</p:sld>
+</file>
+
+<file path=ppt/slides/slide19.xml><?xml version="1.0" encoding="utf-8"?>
+<p:sld xmlns:a="http://schemas.openxmlformats.org/drawingml/2006/main" xmlns:r="http://schemas.openxmlformats.org/officeDocument/2006/relationships" xmlns:p="http://schemas.openxmlformats.org/presentationml/2006/main">
+  <p:cSld>
+    <p:spTree>
+      <p:nvGrpSpPr>
+        <p:cNvPr id="1" name=""/>
+        <p:cNvGrpSpPr/>
+        <p:nvPr/>
+      </p:nvGrpSpPr>
+      <p:grpSpPr>
+        <a:xfrm>
+          <a:off x="0" y="0"/>
+          <a:ext cx="0" cy="0"/>
+          <a:chOff x="0" y="0"/>
+          <a:chExt cx="0" cy="0"/>
+        </a:xfrm>
+      </p:grpSpPr>
+      <p:sp>
+        <p:nvSpPr>
+          <p:cNvPr id="2" name="Title 1">
+            <a:extLst>
+              <a:ext uri="{FF2B5EF4-FFF2-40B4-BE49-F238E27FC236}">
+                <a16:creationId xmlns:a16="http://schemas.microsoft.com/office/drawing/2014/main" id="{B73552DF-13FE-BD36-60F8-DEA44019452E}"/>
+              </a:ext>
+            </a:extLst>
+          </p:cNvPr>
+          <p:cNvSpPr>
+            <a:spLocks noGrp="1"/>
+          </p:cNvSpPr>
+          <p:nvPr>
+            <p:ph type="title"/>
+          </p:nvPr>
+        </p:nvSpPr>
+        <p:spPr>
+          <a:xfrm>
+            <a:off x="403123" y="365125"/>
+            <a:ext cx="11582400" cy="1325563"/>
+          </a:xfrm>
+        </p:spPr>
+        <p:txBody>
+          <a:bodyPr/>
+          <a:lstStyle/>
+          <a:p>
+            <a:r>
+              <a:rPr lang="en-CA" dirty="0"/>
+              <a:t>Ease in and ease out (BONUS)</a:t>
+            </a:r>
+          </a:p>
+        </p:txBody>
+      </p:sp>
+      <p:sp>
+        <p:nvSpPr>
+          <p:cNvPr id="3" name="Content Placeholder 2">
+            <a:extLst>
+              <a:ext uri="{FF2B5EF4-FFF2-40B4-BE49-F238E27FC236}">
+                <a16:creationId xmlns:a16="http://schemas.microsoft.com/office/drawing/2014/main" id="{B52C17F2-CD63-4A29-AA13-F38A3E16099E}"/>
+              </a:ext>
+            </a:extLst>
+          </p:cNvPr>
+          <p:cNvSpPr>
+            <a:spLocks noGrp="1"/>
+          </p:cNvSpPr>
+          <p:nvPr>
+            <p:ph idx="1"/>
+          </p:nvPr>
+        </p:nvSpPr>
+        <p:spPr>
+          <a:xfrm>
+            <a:off x="838200" y="1690688"/>
+            <a:ext cx="10515600" cy="4486275"/>
+          </a:xfrm>
+        </p:spPr>
+        <p:txBody>
+          <a:bodyPr>
+            <a:normAutofit/>
+          </a:bodyPr>
+          <a:lstStyle/>
+          <a:p>
+            <a:r>
+              <a:rPr lang="en-CA" dirty="0" err="1"/>
+              <a:t>MoveTo</a:t>
+            </a:r>
+            <a:r>
+              <a:rPr lang="en-CA" dirty="0"/>
+              <a:t>( </a:t>
+            </a:r>
+            <a:r>
+              <a:rPr lang="en-CA" dirty="0" err="1"/>
+              <a:t>StartXYZ</a:t>
+            </a:r>
+            <a:r>
+              <a:rPr lang="en-CA" dirty="0"/>
+              <a:t>, </a:t>
+            </a:r>
+            <a:r>
+              <a:rPr lang="en-CA" dirty="0" err="1"/>
+              <a:t>EndXYZ</a:t>
+            </a:r>
+            <a:r>
+              <a:rPr lang="en-CA" dirty="0"/>
+              <a:t>, </a:t>
+            </a:r>
+            <a:r>
+              <a:rPr lang="en-CA" dirty="0" err="1"/>
+              <a:t>maxSpeed</a:t>
+            </a:r>
+            <a:r>
+              <a:rPr lang="en-CA" dirty="0"/>
+              <a:t>, </a:t>
+            </a:r>
+            <a:br>
+              <a:rPr lang="en-CA" dirty="0"/>
+            </a:br>
+            <a:r>
+              <a:rPr lang="en-CA" dirty="0"/>
+              <a:t>                 10% </a:t>
+            </a:r>
+            <a:r>
+              <a:rPr lang="en-CA" dirty="0" err="1"/>
+              <a:t>easeIn</a:t>
+            </a:r>
+            <a:r>
+              <a:rPr lang="en-CA" dirty="0"/>
+              <a:t>, 20% </a:t>
+            </a:r>
+            <a:r>
+              <a:rPr lang="en-CA" dirty="0" err="1"/>
+              <a:t>easeOut</a:t>
+            </a:r>
+            <a:r>
+              <a:rPr lang="en-CA" dirty="0"/>
+              <a:t> )</a:t>
+            </a:r>
+          </a:p>
+          <a:p>
+            <a:pPr marL="0" indent="0">
+              <a:buNone/>
+            </a:pPr>
+            <a:endParaRPr lang="en-CA" dirty="0"/>
+          </a:p>
+          <a:p>
+            <a:endParaRPr lang="en-CA" dirty="0"/>
+          </a:p>
+        </p:txBody>
+      </p:sp>
+    </p:spTree>
+    <p:extLst>
+      <p:ext uri="{BB962C8B-B14F-4D97-AF65-F5344CB8AC3E}">
+        <p14:creationId xmlns:p14="http://schemas.microsoft.com/office/powerpoint/2010/main" val="66990789"/>
       </p:ext>
     </p:extLst>
   </p:cSld>

</xml_diff>